<commit_message>
add embedding method in PPT
</commit_message>
<xml_diff>
--- a/slides.pptx
+++ b/slides.pptx
@@ -5,7 +5,7 @@
     <p:sldMasterId id="2147483648" r:id="rId1"/>
   </p:sldMasterIdLst>
   <p:notesMasterIdLst>
-    <p:notesMasterId r:id="rId17"/>
+    <p:notesMasterId r:id="rId20"/>
   </p:notesMasterIdLst>
   <p:sldIdLst>
     <p:sldId id="260" r:id="rId2"/>
@@ -21,8 +21,11 @@
     <p:sldId id="267" r:id="rId12"/>
     <p:sldId id="270" r:id="rId13"/>
     <p:sldId id="268" r:id="rId14"/>
-    <p:sldId id="269" r:id="rId15"/>
-    <p:sldId id="259" r:id="rId16"/>
+    <p:sldId id="273" r:id="rId15"/>
+    <p:sldId id="274" r:id="rId16"/>
+    <p:sldId id="272" r:id="rId17"/>
+    <p:sldId id="269" r:id="rId18"/>
+    <p:sldId id="259" r:id="rId19"/>
   </p:sldIdLst>
   <p:sldSz cx="12192000" cy="6858000"/>
   <p:notesSz cx="6858000" cy="9144000"/>
@@ -554,6 +557,98 @@
     <p:extLst>
       <p:ext uri="{BB962C8B-B14F-4D97-AF65-F5344CB8AC3E}">
         <p14:creationId xmlns:p14="http://schemas.microsoft.com/office/powerpoint/2010/main" val="3079057444"/>
+      </p:ext>
+    </p:extLst>
+  </p:cSld>
+  <p:clrMapOvr>
+    <a:masterClrMapping/>
+  </p:clrMapOvr>
+</p:notes>
+</file>
+
+<file path=ppt/notesSlides/notesSlide2.xml><?xml version="1.0" encoding="utf-8"?>
+<p:notes xmlns:a="http://schemas.openxmlformats.org/drawingml/2006/main" xmlns:r="http://schemas.openxmlformats.org/officeDocument/2006/relationships" xmlns:p="http://schemas.openxmlformats.org/presentationml/2006/main">
+  <p:cSld>
+    <p:spTree>
+      <p:nvGrpSpPr>
+        <p:cNvPr id="1" name=""/>
+        <p:cNvGrpSpPr/>
+        <p:nvPr/>
+      </p:nvGrpSpPr>
+      <p:grpSpPr>
+        <a:xfrm>
+          <a:off x="0" y="0"/>
+          <a:ext cx="0" cy="0"/>
+          <a:chOff x="0" y="0"/>
+          <a:chExt cx="0" cy="0"/>
+        </a:xfrm>
+      </p:grpSpPr>
+      <p:sp>
+        <p:nvSpPr>
+          <p:cNvPr id="2" name="幻灯片图像占位符 1"/>
+          <p:cNvSpPr>
+            <a:spLocks noGrp="1" noRot="1" noChangeAspect="1"/>
+          </p:cNvSpPr>
+          <p:nvPr>
+            <p:ph type="sldImg"/>
+          </p:nvPr>
+        </p:nvSpPr>
+        <p:spPr/>
+      </p:sp>
+      <p:sp>
+        <p:nvSpPr>
+          <p:cNvPr id="3" name="备注占位符 2"/>
+          <p:cNvSpPr>
+            <a:spLocks noGrp="1"/>
+          </p:cNvSpPr>
+          <p:nvPr>
+            <p:ph type="body" idx="1"/>
+          </p:nvPr>
+        </p:nvSpPr>
+        <p:spPr/>
+        <p:txBody>
+          <a:bodyPr/>
+          <a:lstStyle/>
+          <a:p>
+            <a:r>
+              <a:rPr lang="en-US" altLang="zh-CN" dirty="0" smtClean="0"/>
+              <a:t>Evaluation: relation</a:t>
+            </a:r>
+            <a:r>
+              <a:rPr lang="en-US" altLang="zh-CN" baseline="0" dirty="0" smtClean="0"/>
+              <a:t> query</a:t>
+            </a:r>
+            <a:endParaRPr lang="zh-CN" altLang="en-US" dirty="0"/>
+          </a:p>
+        </p:txBody>
+      </p:sp>
+      <p:sp>
+        <p:nvSpPr>
+          <p:cNvPr id="4" name="灯片编号占位符 3"/>
+          <p:cNvSpPr>
+            <a:spLocks noGrp="1"/>
+          </p:cNvSpPr>
+          <p:nvPr>
+            <p:ph type="sldNum" sz="quarter" idx="10"/>
+          </p:nvPr>
+        </p:nvSpPr>
+        <p:spPr/>
+        <p:txBody>
+          <a:bodyPr/>
+          <a:lstStyle/>
+          <a:p>
+            <a:fld id="{5BC1B2AF-D148-4930-8C55-D7C7EE40D033}" type="slidenum">
+              <a:rPr lang="zh-CN" altLang="en-US" smtClean="0"/>
+              <a:t>15</a:t>
+            </a:fld>
+            <a:endParaRPr lang="zh-CN" altLang="en-US"/>
+          </a:p>
+        </p:txBody>
+      </p:sp>
+    </p:spTree>
+    <p:extLst>
+      <p:ext uri="{BB962C8B-B14F-4D97-AF65-F5344CB8AC3E}">
+        <p14:creationId xmlns:p14="http://schemas.microsoft.com/office/powerpoint/2010/main" val="2863346552"/>
       </p:ext>
     </p:extLst>
   </p:cSld>
@@ -3987,7 +4082,7 @@
         </p:blipFill>
         <p:spPr bwMode="auto">
           <a:xfrm>
-            <a:off x="2689051" y="3717925"/>
+            <a:off x="3182827" y="3717925"/>
             <a:ext cx="4705350" cy="2324101"/>
           </a:xfrm>
           <a:prstGeom prst="rect">
@@ -4109,11 +4204,7 @@
             <a:pPr lvl="1"/>
             <a:r>
               <a:rPr lang="en-US" altLang="zh-CN" dirty="0" smtClean="0"/>
-              <a:t>Input</a:t>
-            </a:r>
-            <a:r>
-              <a:rPr lang="en-US" altLang="zh-CN" dirty="0" smtClean="0"/>
-              <a:t>: BOW Matrix</a:t>
+              <a:t>Input: BOW Matrix</a:t>
             </a:r>
           </a:p>
           <a:p>
@@ -4299,14 +4390,20 @@
         </p:nvSpPr>
         <p:spPr/>
         <p:txBody>
-          <a:bodyPr/>
-          <a:lstStyle/>
-          <a:p>
-            <a:r>
-              <a:rPr lang="en-US" altLang="zh-CN" dirty="0" smtClean="0"/>
-              <a:t>Word2Vec I – Embedding Method</a:t>
-            </a:r>
-            <a:endParaRPr lang="zh-CN" altLang="en-US" dirty="0"/>
+          <a:bodyPr>
+            <a:normAutofit/>
+          </a:bodyPr>
+          <a:lstStyle/>
+          <a:p>
+            <a:r>
+              <a:rPr lang="en-US" altLang="zh-CN" sz="3600" dirty="0" smtClean="0"/>
+              <a:t>Word2Vec I – </a:t>
+            </a:r>
+            <a:r>
+              <a:rPr lang="en-US" altLang="zh-CN" sz="3600" dirty="0" smtClean="0"/>
+              <a:t>Co-occurrence Matrix Decomposition</a:t>
+            </a:r>
+            <a:endParaRPr lang="zh-CN" altLang="en-US" sz="3600" dirty="0"/>
           </a:p>
         </p:txBody>
       </p:sp>
@@ -4334,21 +4431,160 @@
             <a:pPr lvl="1"/>
             <a:r>
               <a:rPr lang="en-US" dirty="0" smtClean="0"/>
-              <a:t>unsupervised learning, co-occurrence modeling, mapping a word to a n-dimension vector.</a:t>
+              <a:t>unsupervised learning, co-occurrence modeling, mapping a word to a </a:t>
+            </a:r>
+            <a:r>
+              <a:rPr lang="en-US" dirty="0" smtClean="0"/>
+              <a:t>k-dimension </a:t>
+            </a:r>
+            <a:r>
+              <a:rPr lang="en-US" dirty="0" smtClean="0"/>
+              <a:t>vector.</a:t>
             </a:r>
           </a:p>
           <a:p>
             <a:pPr lvl="1"/>
-            <a:r>
-              <a:rPr lang="en-US" dirty="0" smtClean="0"/>
-              <a:t>CBOW</a:t>
-            </a:r>
+            <a:endParaRPr lang="en-US" dirty="0" smtClean="0"/>
           </a:p>
           <a:p>
             <a:pPr marL="0" indent="0">
               <a:buNone/>
             </a:pPr>
             <a:endParaRPr lang="en-US" dirty="0"/>
+          </a:p>
+        </p:txBody>
+      </p:sp>
+      <p:pic>
+        <p:nvPicPr>
+          <p:cNvPr id="5" name="图片 4"/>
+          <p:cNvPicPr>
+            <a:picLocks noChangeAspect="1"/>
+          </p:cNvPicPr>
+          <p:nvPr/>
+        </p:nvPicPr>
+        <p:blipFill>
+          <a:blip r:embed="rId2"/>
+          <a:stretch>
+            <a:fillRect/>
+          </a:stretch>
+        </p:blipFill>
+        <p:spPr>
+          <a:xfrm>
+            <a:off x="357378" y="3210370"/>
+            <a:ext cx="5101590" cy="3314064"/>
+          </a:xfrm>
+          <a:prstGeom prst="rect">
+            <a:avLst/>
+          </a:prstGeom>
+        </p:spPr>
+      </p:pic>
+      <p:pic>
+        <p:nvPicPr>
+          <p:cNvPr id="6" name="图片 5"/>
+          <p:cNvPicPr>
+            <a:picLocks noChangeAspect="1"/>
+          </p:cNvPicPr>
+          <p:nvPr/>
+        </p:nvPicPr>
+        <p:blipFill>
+          <a:blip r:embed="rId3"/>
+          <a:stretch>
+            <a:fillRect/>
+          </a:stretch>
+        </p:blipFill>
+        <p:spPr>
+          <a:xfrm>
+            <a:off x="5458968" y="4163772"/>
+            <a:ext cx="6583680" cy="1613002"/>
+          </a:xfrm>
+          <a:prstGeom prst="rect">
+            <a:avLst/>
+          </a:prstGeom>
+        </p:spPr>
+      </p:pic>
+      <p:sp>
+        <p:nvSpPr>
+          <p:cNvPr id="7" name="文本框 6"/>
+          <p:cNvSpPr txBox="1"/>
+          <p:nvPr/>
+        </p:nvSpPr>
+        <p:spPr>
+          <a:xfrm>
+            <a:off x="8491582" y="5740646"/>
+            <a:ext cx="562975" cy="369332"/>
+          </a:xfrm>
+          <a:prstGeom prst="rect">
+            <a:avLst/>
+          </a:prstGeom>
+          <a:noFill/>
+        </p:spPr>
+        <p:txBody>
+          <a:bodyPr wrap="none" rtlCol="0">
+            <a:spAutoFit/>
+          </a:bodyPr>
+          <a:lstStyle/>
+          <a:p>
+            <a:r>
+              <a:rPr lang="en-US" altLang="zh-CN" dirty="0" smtClean="0"/>
+              <a:t>SVD</a:t>
+            </a:r>
+            <a:endParaRPr lang="zh-CN" altLang="en-US" dirty="0"/>
+          </a:p>
+        </p:txBody>
+      </p:sp>
+      <p:sp>
+        <p:nvSpPr>
+          <p:cNvPr id="8" name="文本框 7"/>
+          <p:cNvSpPr txBox="1"/>
+          <p:nvPr/>
+        </p:nvSpPr>
+        <p:spPr>
+          <a:xfrm>
+            <a:off x="6007608" y="5925312"/>
+            <a:ext cx="184731" cy="369332"/>
+          </a:xfrm>
+          <a:prstGeom prst="rect">
+            <a:avLst/>
+          </a:prstGeom>
+          <a:noFill/>
+        </p:spPr>
+        <p:txBody>
+          <a:bodyPr wrap="none" rtlCol="0">
+            <a:spAutoFit/>
+          </a:bodyPr>
+          <a:lstStyle/>
+          <a:p>
+            <a:endParaRPr lang="zh-CN" altLang="en-US" dirty="0"/>
+          </a:p>
+        </p:txBody>
+      </p:sp>
+      <p:sp>
+        <p:nvSpPr>
+          <p:cNvPr id="10" name="文本框 9"/>
+          <p:cNvSpPr txBox="1"/>
+          <p:nvPr/>
+        </p:nvSpPr>
+        <p:spPr>
+          <a:xfrm>
+            <a:off x="7241432" y="6127234"/>
+            <a:ext cx="3063274" cy="369332"/>
+          </a:xfrm>
+          <a:prstGeom prst="rect">
+            <a:avLst/>
+          </a:prstGeom>
+          <a:noFill/>
+        </p:spPr>
+        <p:txBody>
+          <a:bodyPr wrap="none" rtlCol="0">
+            <a:spAutoFit/>
+          </a:bodyPr>
+          <a:lstStyle/>
+          <a:p>
+            <a:r>
+              <a:rPr lang="en-US" altLang="zh-CN" dirty="0" smtClean="0"/>
+              <a:t>Rows of U are the word vector.</a:t>
+            </a:r>
+            <a:endParaRPr lang="zh-CN" altLang="en-US" dirty="0"/>
           </a:p>
         </p:txBody>
       </p:sp>
@@ -4401,56 +4637,1136 @@
         </p:nvSpPr>
         <p:spPr/>
         <p:txBody>
+          <a:bodyPr>
+            <a:normAutofit/>
+          </a:bodyPr>
+          <a:lstStyle/>
+          <a:p>
+            <a:r>
+              <a:rPr lang="en-US" altLang="zh-CN" dirty="0" smtClean="0"/>
+              <a:t>Word2Vec </a:t>
+            </a:r>
+            <a:r>
+              <a:rPr lang="en-US" altLang="zh-CN" dirty="0" smtClean="0"/>
+              <a:t>II </a:t>
+            </a:r>
+            <a:r>
+              <a:rPr lang="en-US" altLang="zh-CN" dirty="0" smtClean="0"/>
+              <a:t>– </a:t>
+            </a:r>
+            <a:r>
+              <a:rPr lang="en-US" altLang="zh-CN" dirty="0" smtClean="0"/>
+              <a:t>CBOW, Skip-gram</a:t>
+            </a:r>
+            <a:endParaRPr lang="zh-CN" altLang="en-US" dirty="0"/>
+          </a:p>
+        </p:txBody>
+      </p:sp>
+      <p:sp>
+        <p:nvSpPr>
+          <p:cNvPr id="4" name="Content Placeholder 3"/>
+          <p:cNvSpPr>
+            <a:spLocks noGrp="1"/>
+          </p:cNvSpPr>
+          <p:nvPr>
+            <p:ph idx="1"/>
+          </p:nvPr>
+        </p:nvSpPr>
+        <p:spPr/>
+        <p:txBody>
           <a:bodyPr/>
           <a:lstStyle/>
           <a:p>
             <a:r>
-              <a:rPr lang="en-US" altLang="zh-CN" dirty="0" smtClean="0"/>
-              <a:t>Word2Vec II – Sequential Modeling</a:t>
-            </a:r>
-            <a:endParaRPr lang="zh-CN" altLang="en-US" dirty="0"/>
-          </a:p>
-        </p:txBody>
-      </p:sp>
-      <p:sp>
-        <p:nvSpPr>
-          <p:cNvPr id="4" name="Content Placeholder 3"/>
-          <p:cNvSpPr>
-            <a:spLocks noGrp="1"/>
-          </p:cNvSpPr>
-          <p:nvPr>
-            <p:ph idx="1"/>
-          </p:nvPr>
-        </p:nvSpPr>
-        <p:spPr/>
-        <p:txBody>
-          <a:bodyPr/>
-          <a:lstStyle/>
-          <a:p>
-            <a:r>
               <a:rPr lang="en-US" dirty="0" smtClean="0"/>
-              <a:t>Use unsupervised word </a:t>
-            </a:r>
-            <a:r>
-              <a:rPr lang="en-US" dirty="0" err="1" smtClean="0"/>
-              <a:t>vec</a:t>
-            </a:r>
+              <a:t>Word2Vec: </a:t>
+            </a:r>
+          </a:p>
+          <a:p>
+            <a:pPr lvl="1"/>
             <a:r>
               <a:rPr lang="en-US" dirty="0" smtClean="0"/>
-              <a:t> as input</a:t>
-            </a:r>
-          </a:p>
-          <a:p>
-            <a:r>
-              <a:rPr lang="en-US" dirty="0" smtClean="0"/>
-              <a:t>Apply RNN to model doc sequentially.</a:t>
-            </a:r>
+              <a:t>Predict Surrounding words in a window of length c of every word.</a:t>
+            </a:r>
+            <a:endParaRPr lang="en-US" dirty="0" smtClean="0"/>
+          </a:p>
+          <a:p>
+            <a:pPr lvl="1"/>
+            <a:endParaRPr lang="en-US" dirty="0" smtClean="0"/>
           </a:p>
           <a:p>
             <a:pPr marL="0" indent="0">
               <a:buNone/>
             </a:pPr>
             <a:endParaRPr lang="en-US" dirty="0"/>
+          </a:p>
+        </p:txBody>
+      </p:sp>
+      <p:sp>
+        <p:nvSpPr>
+          <p:cNvPr id="8" name="文本框 7"/>
+          <p:cNvSpPr txBox="1"/>
+          <p:nvPr/>
+        </p:nvSpPr>
+        <p:spPr>
+          <a:xfrm>
+            <a:off x="6007608" y="5925312"/>
+            <a:ext cx="184731" cy="369332"/>
+          </a:xfrm>
+          <a:prstGeom prst="rect">
+            <a:avLst/>
+          </a:prstGeom>
+          <a:noFill/>
+        </p:spPr>
+        <p:txBody>
+          <a:bodyPr wrap="none" rtlCol="0">
+            <a:spAutoFit/>
+          </a:bodyPr>
+          <a:lstStyle/>
+          <a:p>
+            <a:endParaRPr lang="zh-CN" altLang="en-US" dirty="0"/>
+          </a:p>
+        </p:txBody>
+      </p:sp>
+      <p:pic>
+        <p:nvPicPr>
+          <p:cNvPr id="3" name="图片 2"/>
+          <p:cNvPicPr>
+            <a:picLocks noChangeAspect="1"/>
+          </p:cNvPicPr>
+          <p:nvPr/>
+        </p:nvPicPr>
+        <p:blipFill>
+          <a:blip r:embed="rId2"/>
+          <a:stretch>
+            <a:fillRect/>
+          </a:stretch>
+        </p:blipFill>
+        <p:spPr>
+          <a:xfrm>
+            <a:off x="6215123" y="2890587"/>
+            <a:ext cx="4050322" cy="902643"/>
+          </a:xfrm>
+          <a:prstGeom prst="rect">
+            <a:avLst/>
+          </a:prstGeom>
+        </p:spPr>
+      </p:pic>
+      <p:pic>
+        <p:nvPicPr>
+          <p:cNvPr id="9" name="图片 8"/>
+          <p:cNvPicPr>
+            <a:picLocks noChangeAspect="1"/>
+          </p:cNvPicPr>
+          <p:nvPr/>
+        </p:nvPicPr>
+        <p:blipFill>
+          <a:blip r:embed="rId3"/>
+          <a:stretch>
+            <a:fillRect/>
+          </a:stretch>
+        </p:blipFill>
+        <p:spPr>
+          <a:xfrm>
+            <a:off x="6096000" y="4054639"/>
+            <a:ext cx="4468939" cy="1437211"/>
+          </a:xfrm>
+          <a:prstGeom prst="rect">
+            <a:avLst/>
+          </a:prstGeom>
+        </p:spPr>
+      </p:pic>
+      <mc:AlternateContent xmlns:mc="http://schemas.openxmlformats.org/markup-compatibility/2006">
+        <mc:Choice xmlns:a14="http://schemas.microsoft.com/office/drawing/2010/main" Requires="a14">
+          <p:sp>
+            <p:nvSpPr>
+              <p:cNvPr id="11" name="文本框 10"/>
+              <p:cNvSpPr txBox="1"/>
+              <p:nvPr/>
+            </p:nvSpPr>
+            <p:spPr>
+              <a:xfrm>
+                <a:off x="7821398" y="5648313"/>
+                <a:ext cx="1903342" cy="461665"/>
+              </a:xfrm>
+              <a:prstGeom prst="rect">
+                <a:avLst/>
+              </a:prstGeom>
+              <a:noFill/>
+            </p:spPr>
+            <p:txBody>
+              <a:bodyPr wrap="none" rtlCol="0">
+                <a:spAutoFit/>
+              </a:bodyPr>
+              <a:lstStyle/>
+              <a:p>
+                <a14:m>
+                  <m:oMathPara xmlns:m="http://schemas.openxmlformats.org/officeDocument/2006/math">
+                    <m:oMathParaPr>
+                      <m:jc m:val="centerGroup"/>
+                    </m:oMathParaPr>
+                    <m:oMath xmlns:m="http://schemas.openxmlformats.org/officeDocument/2006/math">
+                      <m:r>
+                        <a:rPr lang="en-US" altLang="zh-CN" sz="2400" b="0" i="1" smtClean="0">
+                          <a:latin typeface="Cambria Math" panose="02040503050406030204" pitchFamily="18" charset="0"/>
+                        </a:rPr>
+                        <m:t>𝑤</m:t>
+                      </m:r>
+                      <m:r>
+                        <a:rPr lang="en-US" altLang="zh-CN" sz="2400" b="0" i="1" smtClean="0">
+                          <a:latin typeface="Cambria Math" panose="02040503050406030204" pitchFamily="18" charset="0"/>
+                        </a:rPr>
+                        <m:t>=[</m:t>
+                      </m:r>
+                      <m:sSub>
+                        <m:sSubPr>
+                          <m:ctrlPr>
+                            <a:rPr lang="en-US" altLang="zh-CN" sz="2400" b="0" i="1" smtClean="0">
+                              <a:latin typeface="Cambria Math" panose="02040503050406030204" pitchFamily="18" charset="0"/>
+                            </a:rPr>
+                          </m:ctrlPr>
+                        </m:sSubPr>
+                        <m:e>
+                          <m:r>
+                            <a:rPr lang="en-US" altLang="zh-CN" sz="2400" b="0" i="1" smtClean="0">
+                              <a:latin typeface="Cambria Math" panose="02040503050406030204" pitchFamily="18" charset="0"/>
+                            </a:rPr>
+                            <m:t>𝑤</m:t>
+                          </m:r>
+                        </m:e>
+                        <m:sub>
+                          <m:r>
+                            <a:rPr lang="en-US" altLang="zh-CN" sz="2400" b="0" i="1" smtClean="0">
+                              <a:latin typeface="Cambria Math" panose="02040503050406030204" pitchFamily="18" charset="0"/>
+                            </a:rPr>
+                            <m:t>𝑜</m:t>
+                          </m:r>
+                        </m:sub>
+                      </m:sSub>
+                      <m:r>
+                        <a:rPr lang="en-US" altLang="zh-CN" sz="2400" b="0" i="1" smtClean="0">
+                          <a:latin typeface="Cambria Math" panose="02040503050406030204" pitchFamily="18" charset="0"/>
+                        </a:rPr>
+                        <m:t>, </m:t>
+                      </m:r>
+                      <m:sSub>
+                        <m:sSubPr>
+                          <m:ctrlPr>
+                            <a:rPr lang="en-US" altLang="zh-CN" sz="2400" b="0" i="1" smtClean="0">
+                              <a:latin typeface="Cambria Math" panose="02040503050406030204" pitchFamily="18" charset="0"/>
+                            </a:rPr>
+                          </m:ctrlPr>
+                        </m:sSubPr>
+                        <m:e>
+                          <m:r>
+                            <a:rPr lang="en-US" altLang="zh-CN" sz="2400" b="0" i="1" smtClean="0">
+                              <a:latin typeface="Cambria Math" panose="02040503050406030204" pitchFamily="18" charset="0"/>
+                            </a:rPr>
+                            <m:t>𝑤</m:t>
+                          </m:r>
+                        </m:e>
+                        <m:sub>
+                          <m:r>
+                            <a:rPr lang="en-US" altLang="zh-CN" sz="2400" b="0" i="1" smtClean="0">
+                              <a:latin typeface="Cambria Math" panose="02040503050406030204" pitchFamily="18" charset="0"/>
+                            </a:rPr>
+                            <m:t>𝐼</m:t>
+                          </m:r>
+                        </m:sub>
+                      </m:sSub>
+                      <m:r>
+                        <a:rPr lang="en-US" altLang="zh-CN" sz="2400" b="0" i="1" smtClean="0">
+                          <a:latin typeface="Cambria Math" panose="02040503050406030204" pitchFamily="18" charset="0"/>
+                        </a:rPr>
+                        <m:t>]</m:t>
+                      </m:r>
+                    </m:oMath>
+                  </m:oMathPara>
+                </a14:m>
+                <a:endParaRPr lang="zh-CN" altLang="en-US" sz="2400" dirty="0"/>
+              </a:p>
+            </p:txBody>
+          </p:sp>
+        </mc:Choice>
+        <mc:Fallback>
+          <p:sp>
+            <p:nvSpPr>
+              <p:cNvPr id="11" name="文本框 10"/>
+              <p:cNvSpPr txBox="1">
+                <a:spLocks noRot="1" noChangeAspect="1" noMove="1" noResize="1" noEditPoints="1" noAdjustHandles="1" noChangeArrowheads="1" noChangeShapeType="1" noTextEdit="1"/>
+              </p:cNvSpPr>
+              <p:nvPr/>
+            </p:nvSpPr>
+            <p:spPr>
+              <a:xfrm>
+                <a:off x="7821398" y="5648313"/>
+                <a:ext cx="1903342" cy="461665"/>
+              </a:xfrm>
+              <a:prstGeom prst="rect">
+                <a:avLst/>
+              </a:prstGeom>
+              <a:blipFill rotWithShape="0">
+                <a:blip r:embed="rId4"/>
+                <a:stretch>
+                  <a:fillRect r="-962" b="-18667"/>
+                </a:stretch>
+              </a:blipFill>
+            </p:spPr>
+            <p:txBody>
+              <a:bodyPr/>
+              <a:lstStyle/>
+              <a:p>
+                <a:r>
+                  <a:rPr lang="zh-CN" altLang="en-US">
+                    <a:noFill/>
+                  </a:rPr>
+                  <a:t> </a:t>
+                </a:r>
+              </a:p>
+            </p:txBody>
+          </p:sp>
+        </mc:Fallback>
+      </mc:AlternateContent>
+      <p:pic>
+        <p:nvPicPr>
+          <p:cNvPr id="1026" name="Picture 2" descr="http://img.blog.csdn.net/20140528170902546"/>
+          <p:cNvPicPr>
+            <a:picLocks noChangeAspect="1" noChangeArrowheads="1"/>
+          </p:cNvPicPr>
+          <p:nvPr/>
+        </p:nvPicPr>
+        <p:blipFill>
+          <a:blip r:embed="rId5">
+            <a:extLst>
+              <a:ext uri="{28A0092B-C50C-407E-A947-70E740481C1C}">
+                <a14:useLocalDpi xmlns:a14="http://schemas.microsoft.com/office/drawing/2010/main" val="0"/>
+              </a:ext>
+            </a:extLst>
+          </a:blip>
+          <a:srcRect/>
+          <a:stretch>
+            <a:fillRect/>
+          </a:stretch>
+        </p:blipFill>
+        <p:spPr bwMode="auto">
+          <a:xfrm>
+            <a:off x="227478" y="2890587"/>
+            <a:ext cx="2699105" cy="3692918"/>
+          </a:xfrm>
+          <a:prstGeom prst="rect">
+            <a:avLst/>
+          </a:prstGeom>
+          <a:noFill/>
+          <a:extLst>
+            <a:ext uri="{909E8E84-426E-40DD-AFC4-6F175D3DCCD1}">
+              <a14:hiddenFill xmlns:a14="http://schemas.microsoft.com/office/drawing/2010/main">
+                <a:solidFill>
+                  <a:srgbClr val="FFFFFF"/>
+                </a:solidFill>
+              </a14:hiddenFill>
+            </a:ext>
+          </a:extLst>
+        </p:spPr>
+      </p:pic>
+      <p:pic>
+        <p:nvPicPr>
+          <p:cNvPr id="12" name="图片 11"/>
+          <p:cNvPicPr>
+            <a:picLocks noChangeAspect="1"/>
+          </p:cNvPicPr>
+          <p:nvPr/>
+        </p:nvPicPr>
+        <p:blipFill>
+          <a:blip r:embed="rId6"/>
+          <a:stretch>
+            <a:fillRect/>
+          </a:stretch>
+        </p:blipFill>
+        <p:spPr>
+          <a:xfrm>
+            <a:off x="3110692" y="3054096"/>
+            <a:ext cx="2712496" cy="3328416"/>
+          </a:xfrm>
+          <a:prstGeom prst="rect">
+            <a:avLst/>
+          </a:prstGeom>
+        </p:spPr>
+      </p:pic>
+    </p:spTree>
+    <p:extLst>
+      <p:ext uri="{BB962C8B-B14F-4D97-AF65-F5344CB8AC3E}">
+        <p14:creationId xmlns:p14="http://schemas.microsoft.com/office/powerpoint/2010/main" val="618665443"/>
+      </p:ext>
+    </p:extLst>
+  </p:cSld>
+  <p:clrMapOvr>
+    <a:masterClrMapping/>
+  </p:clrMapOvr>
+  <p:timing>
+    <p:tnLst>
+      <p:par>
+        <p:cTn id="1" dur="indefinite" restart="never" nodeType="tmRoot"/>
+      </p:par>
+    </p:tnLst>
+  </p:timing>
+</p:sld>
+</file>
+
+<file path=ppt/slides/slide15.xml><?xml version="1.0" encoding="utf-8"?>
+<p:sld xmlns:a="http://schemas.openxmlformats.org/drawingml/2006/main" xmlns:r="http://schemas.openxmlformats.org/officeDocument/2006/relationships" xmlns:p="http://schemas.openxmlformats.org/presentationml/2006/main">
+  <p:cSld>
+    <p:spTree>
+      <p:nvGrpSpPr>
+        <p:cNvPr id="1" name=""/>
+        <p:cNvGrpSpPr/>
+        <p:nvPr/>
+      </p:nvGrpSpPr>
+      <p:grpSpPr>
+        <a:xfrm>
+          <a:off x="0" y="0"/>
+          <a:ext cx="0" cy="0"/>
+          <a:chOff x="0" y="0"/>
+          <a:chExt cx="0" cy="0"/>
+        </a:xfrm>
+      </p:grpSpPr>
+      <p:sp>
+        <p:nvSpPr>
+          <p:cNvPr id="2" name="标题 1"/>
+          <p:cNvSpPr>
+            <a:spLocks noGrp="1"/>
+          </p:cNvSpPr>
+          <p:nvPr>
+            <p:ph type="title"/>
+          </p:nvPr>
+        </p:nvSpPr>
+        <p:spPr/>
+        <p:txBody>
+          <a:bodyPr/>
+          <a:lstStyle/>
+          <a:p>
+            <a:r>
+              <a:rPr lang="en-US" altLang="zh-CN" dirty="0"/>
+              <a:t>Word2Vec </a:t>
+            </a:r>
+            <a:r>
+              <a:rPr lang="en-US" altLang="zh-CN" dirty="0" smtClean="0"/>
+              <a:t>III - Advantages</a:t>
+            </a:r>
+            <a:endParaRPr lang="zh-CN" altLang="en-US" dirty="0"/>
+          </a:p>
+        </p:txBody>
+      </p:sp>
+      <p:sp>
+        <p:nvSpPr>
+          <p:cNvPr id="3" name="内容占位符 2"/>
+          <p:cNvSpPr>
+            <a:spLocks noGrp="1"/>
+          </p:cNvSpPr>
+          <p:nvPr>
+            <p:ph idx="1"/>
+          </p:nvPr>
+        </p:nvSpPr>
+        <p:spPr/>
+        <p:txBody>
+          <a:bodyPr/>
+          <a:lstStyle/>
+          <a:p>
+            <a:r>
+              <a:rPr lang="en-US" altLang="zh-CN" dirty="0" smtClean="0"/>
+              <a:t>Capture Relations:</a:t>
+            </a:r>
+          </a:p>
+          <a:p>
+            <a:endParaRPr lang="en-US" altLang="zh-CN" dirty="0"/>
+          </a:p>
+          <a:p>
+            <a:endParaRPr lang="en-US" altLang="zh-CN" dirty="0" smtClean="0"/>
+          </a:p>
+          <a:p>
+            <a:pPr lvl="1"/>
+            <a:endParaRPr lang="en-US" altLang="zh-CN" dirty="0"/>
+          </a:p>
+          <a:p>
+            <a:endParaRPr lang="en-US" altLang="zh-CN" dirty="0" smtClean="0"/>
+          </a:p>
+          <a:p>
+            <a:r>
+              <a:rPr lang="en-US" altLang="zh-CN" dirty="0" smtClean="0"/>
+              <a:t>Can be initial values of other jobs, especially embedding work in many NN-based tasks.</a:t>
+            </a:r>
+          </a:p>
+          <a:p>
+            <a:endParaRPr lang="en-US" altLang="zh-CN" dirty="0"/>
+          </a:p>
+          <a:p>
+            <a:endParaRPr lang="zh-CN" altLang="en-US" dirty="0"/>
+          </a:p>
+        </p:txBody>
+      </p:sp>
+      <p:pic>
+        <p:nvPicPr>
+          <p:cNvPr id="4" name="图片 3"/>
+          <p:cNvPicPr>
+            <a:picLocks noChangeAspect="1"/>
+          </p:cNvPicPr>
+          <p:nvPr/>
+        </p:nvPicPr>
+        <p:blipFill>
+          <a:blip r:embed="rId3"/>
+          <a:stretch>
+            <a:fillRect/>
+          </a:stretch>
+        </p:blipFill>
+        <p:spPr>
+          <a:xfrm>
+            <a:off x="1110424" y="2269617"/>
+            <a:ext cx="4905375" cy="1276350"/>
+          </a:xfrm>
+          <a:prstGeom prst="rect">
+            <a:avLst/>
+          </a:prstGeom>
+        </p:spPr>
+      </p:pic>
+    </p:spTree>
+    <p:extLst>
+      <p:ext uri="{BB962C8B-B14F-4D97-AF65-F5344CB8AC3E}">
+        <p14:creationId xmlns:p14="http://schemas.microsoft.com/office/powerpoint/2010/main" val="2106129500"/>
+      </p:ext>
+    </p:extLst>
+  </p:cSld>
+  <p:clrMapOvr>
+    <a:masterClrMapping/>
+  </p:clrMapOvr>
+</p:sld>
+</file>
+
+<file path=ppt/slides/slide16.xml><?xml version="1.0" encoding="utf-8"?>
+<p:sld xmlns:a="http://schemas.openxmlformats.org/drawingml/2006/main" xmlns:r="http://schemas.openxmlformats.org/officeDocument/2006/relationships" xmlns:p="http://schemas.openxmlformats.org/presentationml/2006/main">
+  <p:cSld>
+    <p:spTree>
+      <p:nvGrpSpPr>
+        <p:cNvPr id="1" name=""/>
+        <p:cNvGrpSpPr/>
+        <p:nvPr/>
+      </p:nvGrpSpPr>
+      <p:grpSpPr>
+        <a:xfrm>
+          <a:off x="0" y="0"/>
+          <a:ext cx="0" cy="0"/>
+          <a:chOff x="0" y="0"/>
+          <a:chExt cx="0" cy="0"/>
+        </a:xfrm>
+      </p:grpSpPr>
+      <p:sp>
+        <p:nvSpPr>
+          <p:cNvPr id="2" name="标题 1"/>
+          <p:cNvSpPr>
+            <a:spLocks noGrp="1"/>
+          </p:cNvSpPr>
+          <p:nvPr>
+            <p:ph type="title"/>
+          </p:nvPr>
+        </p:nvSpPr>
+        <p:spPr/>
+        <p:txBody>
+          <a:bodyPr/>
+          <a:lstStyle/>
+          <a:p>
+            <a:r>
+              <a:rPr lang="en-US" altLang="zh-CN" dirty="0" smtClean="0"/>
+              <a:t>Word2Vec I – Embedding Method</a:t>
+            </a:r>
+            <a:endParaRPr lang="zh-CN" altLang="en-US" dirty="0"/>
+          </a:p>
+        </p:txBody>
+      </p:sp>
+      <p:sp>
+        <p:nvSpPr>
+          <p:cNvPr id="4" name="Content Placeholder 3"/>
+          <p:cNvSpPr>
+            <a:spLocks noGrp="1"/>
+          </p:cNvSpPr>
+          <p:nvPr>
+            <p:ph idx="1"/>
+          </p:nvPr>
+        </p:nvSpPr>
+        <p:spPr/>
+        <p:txBody>
+          <a:bodyPr/>
+          <a:lstStyle/>
+          <a:p>
+            <a:r>
+              <a:rPr lang="en-US" dirty="0" smtClean="0"/>
+              <a:t>Word2Vec: </a:t>
+            </a:r>
+          </a:p>
+          <a:p>
+            <a:pPr lvl="1"/>
+            <a:r>
+              <a:rPr lang="en-US" dirty="0" smtClean="0"/>
+              <a:t>unsupervised learning, co-occurrence modeling, mapping a word to a n-dimension vector.</a:t>
+            </a:r>
+          </a:p>
+          <a:p>
+            <a:pPr lvl="1"/>
+            <a:endParaRPr lang="en-US" dirty="0" smtClean="0"/>
+          </a:p>
+          <a:p>
+            <a:pPr marL="0" indent="0">
+              <a:buNone/>
+            </a:pPr>
+            <a:endParaRPr lang="en-US" dirty="0"/>
+          </a:p>
+        </p:txBody>
+      </p:sp>
+    </p:spTree>
+    <p:extLst>
+      <p:ext uri="{BB962C8B-B14F-4D97-AF65-F5344CB8AC3E}">
+        <p14:creationId xmlns:p14="http://schemas.microsoft.com/office/powerpoint/2010/main" val="846530862"/>
+      </p:ext>
+    </p:extLst>
+  </p:cSld>
+  <p:clrMapOvr>
+    <a:masterClrMapping/>
+  </p:clrMapOvr>
+  <p:timing>
+    <p:tnLst>
+      <p:par>
+        <p:cTn id="1" dur="indefinite" restart="never" nodeType="tmRoot"/>
+      </p:par>
+    </p:tnLst>
+  </p:timing>
+</p:sld>
+</file>
+
+<file path=ppt/slides/slide17.xml><?xml version="1.0" encoding="utf-8"?>
+<p:sld xmlns:a="http://schemas.openxmlformats.org/drawingml/2006/main" xmlns:r="http://schemas.openxmlformats.org/officeDocument/2006/relationships" xmlns:p="http://schemas.openxmlformats.org/presentationml/2006/main">
+  <p:cSld>
+    <p:spTree>
+      <p:nvGrpSpPr>
+        <p:cNvPr id="1" name=""/>
+        <p:cNvGrpSpPr/>
+        <p:nvPr/>
+      </p:nvGrpSpPr>
+      <p:grpSpPr>
+        <a:xfrm>
+          <a:off x="0" y="0"/>
+          <a:ext cx="0" cy="0"/>
+          <a:chOff x="0" y="0"/>
+          <a:chExt cx="0" cy="0"/>
+        </a:xfrm>
+      </p:grpSpPr>
+      <p:sp>
+        <p:nvSpPr>
+          <p:cNvPr id="2" name="标题 1"/>
+          <p:cNvSpPr>
+            <a:spLocks noGrp="1"/>
+          </p:cNvSpPr>
+          <p:nvPr>
+            <p:ph type="title"/>
+          </p:nvPr>
+        </p:nvSpPr>
+        <p:spPr/>
+        <p:txBody>
+          <a:bodyPr/>
+          <a:lstStyle/>
+          <a:p>
+            <a:r>
+              <a:rPr lang="en-US" altLang="zh-CN" dirty="0" smtClean="0"/>
+              <a:t>Word2Vec II – Sequential Modeling</a:t>
+            </a:r>
+            <a:endParaRPr lang="zh-CN" altLang="en-US" dirty="0"/>
+          </a:p>
+        </p:txBody>
+      </p:sp>
+      <p:sp>
+        <p:nvSpPr>
+          <p:cNvPr id="4" name="Content Placeholder 3"/>
+          <p:cNvSpPr>
+            <a:spLocks noGrp="1"/>
+          </p:cNvSpPr>
+          <p:nvPr>
+            <p:ph idx="1"/>
+          </p:nvPr>
+        </p:nvSpPr>
+        <p:spPr/>
+        <p:txBody>
+          <a:bodyPr/>
+          <a:lstStyle/>
+          <a:p>
+            <a:r>
+              <a:rPr lang="en-US" dirty="0" smtClean="0"/>
+              <a:t>Use unsupervised word </a:t>
+            </a:r>
+            <a:r>
+              <a:rPr lang="en-US" dirty="0" err="1" smtClean="0"/>
+              <a:t>vec</a:t>
+            </a:r>
+            <a:r>
+              <a:rPr lang="en-US" dirty="0" smtClean="0"/>
+              <a:t> as </a:t>
+            </a:r>
+            <a:r>
+              <a:rPr lang="en-US" dirty="0" smtClean="0"/>
+              <a:t>input.</a:t>
+            </a:r>
+            <a:endParaRPr lang="en-US" dirty="0" smtClean="0"/>
+          </a:p>
+          <a:p>
+            <a:r>
+              <a:rPr lang="en-US" dirty="0" smtClean="0"/>
+              <a:t>Apply </a:t>
+            </a:r>
+            <a:r>
+              <a:rPr lang="en-US" dirty="0" smtClean="0"/>
+              <a:t>RNN </a:t>
+            </a:r>
+            <a:r>
+              <a:rPr lang="en-US" dirty="0" smtClean="0"/>
+              <a:t>to model doc </a:t>
+            </a:r>
+            <a:r>
+              <a:rPr lang="en-US" dirty="0" smtClean="0"/>
+              <a:t>sequentially (very suitable to model short text).</a:t>
+            </a:r>
+          </a:p>
+          <a:p>
+            <a:endParaRPr lang="en-US" dirty="0" smtClean="0"/>
+          </a:p>
+          <a:p>
+            <a:pPr marL="0" indent="0">
+              <a:buNone/>
+            </a:pPr>
+            <a:endParaRPr lang="en-US" dirty="0"/>
+          </a:p>
+        </p:txBody>
+      </p:sp>
+      <p:pic>
+        <p:nvPicPr>
+          <p:cNvPr id="3" name="图片 2"/>
+          <p:cNvPicPr>
+            <a:picLocks noChangeAspect="1"/>
+          </p:cNvPicPr>
+          <p:nvPr/>
+        </p:nvPicPr>
+        <p:blipFill>
+          <a:blip r:embed="rId2"/>
+          <a:stretch>
+            <a:fillRect/>
+          </a:stretch>
+        </p:blipFill>
+        <p:spPr>
+          <a:xfrm>
+            <a:off x="838200" y="3233302"/>
+            <a:ext cx="5980176" cy="3078598"/>
+          </a:xfrm>
+          <a:prstGeom prst="rect">
+            <a:avLst/>
+          </a:prstGeom>
+        </p:spPr>
+      </p:pic>
+      <p:grpSp>
+        <p:nvGrpSpPr>
+          <p:cNvPr id="11" name="组合 10"/>
+          <p:cNvGrpSpPr/>
+          <p:nvPr/>
+        </p:nvGrpSpPr>
+        <p:grpSpPr>
+          <a:xfrm>
+            <a:off x="6891528" y="3776472"/>
+            <a:ext cx="551688" cy="1508760"/>
+            <a:chOff x="6891528" y="3776472"/>
+            <a:chExt cx="551688" cy="1508760"/>
+          </a:xfrm>
+        </p:grpSpPr>
+        <p:sp>
+          <p:nvSpPr>
+            <p:cNvPr id="5" name="矩形 4"/>
+            <p:cNvSpPr/>
+            <p:nvPr/>
+          </p:nvSpPr>
+          <p:spPr>
+            <a:xfrm>
+              <a:off x="6891528" y="3776472"/>
+              <a:ext cx="551688" cy="1508760"/>
+            </a:xfrm>
+            <a:prstGeom prst="rect">
+              <a:avLst/>
+            </a:prstGeom>
+          </p:spPr>
+          <p:style>
+            <a:lnRef idx="2">
+              <a:schemeClr val="dk1"/>
+            </a:lnRef>
+            <a:fillRef idx="1">
+              <a:schemeClr val="lt1"/>
+            </a:fillRef>
+            <a:effectRef idx="0">
+              <a:schemeClr val="dk1"/>
+            </a:effectRef>
+            <a:fontRef idx="minor">
+              <a:schemeClr val="dk1"/>
+            </a:fontRef>
+          </p:style>
+          <p:txBody>
+            <a:bodyPr rtlCol="0" anchor="ctr"/>
+            <a:lstStyle/>
+            <a:p>
+              <a:pPr algn="ctr"/>
+              <a:endParaRPr lang="zh-CN" altLang="en-US"/>
+            </a:p>
+          </p:txBody>
+        </p:sp>
+        <p:sp>
+          <p:nvSpPr>
+            <p:cNvPr id="7" name="椭圆 6"/>
+            <p:cNvSpPr/>
+            <p:nvPr/>
+          </p:nvSpPr>
+          <p:spPr>
+            <a:xfrm>
+              <a:off x="7039356" y="3913632"/>
+              <a:ext cx="246888" cy="246888"/>
+            </a:xfrm>
+            <a:prstGeom prst="ellipse">
+              <a:avLst/>
+            </a:prstGeom>
+          </p:spPr>
+          <p:style>
+            <a:lnRef idx="2">
+              <a:schemeClr val="accent2">
+                <a:shade val="50000"/>
+              </a:schemeClr>
+            </a:lnRef>
+            <a:fillRef idx="1">
+              <a:schemeClr val="accent2"/>
+            </a:fillRef>
+            <a:effectRef idx="0">
+              <a:schemeClr val="accent2"/>
+            </a:effectRef>
+            <a:fontRef idx="minor">
+              <a:schemeClr val="lt1"/>
+            </a:fontRef>
+          </p:style>
+          <p:txBody>
+            <a:bodyPr rtlCol="0" anchor="ctr"/>
+            <a:lstStyle/>
+            <a:p>
+              <a:pPr algn="ctr"/>
+              <a:endParaRPr lang="zh-CN" altLang="en-US"/>
+            </a:p>
+          </p:txBody>
+        </p:sp>
+        <p:sp>
+          <p:nvSpPr>
+            <p:cNvPr id="8" name="椭圆 7"/>
+            <p:cNvSpPr/>
+            <p:nvPr/>
+          </p:nvSpPr>
+          <p:spPr>
+            <a:xfrm>
+              <a:off x="7037832" y="4236815"/>
+              <a:ext cx="246888" cy="246888"/>
+            </a:xfrm>
+            <a:prstGeom prst="ellipse">
+              <a:avLst/>
+            </a:prstGeom>
+          </p:spPr>
+          <p:style>
+            <a:lnRef idx="2">
+              <a:schemeClr val="accent2">
+                <a:shade val="50000"/>
+              </a:schemeClr>
+            </a:lnRef>
+            <a:fillRef idx="1">
+              <a:schemeClr val="accent2"/>
+            </a:fillRef>
+            <a:effectRef idx="0">
+              <a:schemeClr val="accent2"/>
+            </a:effectRef>
+            <a:fontRef idx="minor">
+              <a:schemeClr val="lt1"/>
+            </a:fontRef>
+          </p:style>
+          <p:txBody>
+            <a:bodyPr rtlCol="0" anchor="ctr"/>
+            <a:lstStyle/>
+            <a:p>
+              <a:pPr algn="ctr"/>
+              <a:endParaRPr lang="zh-CN" altLang="en-US"/>
+            </a:p>
+          </p:txBody>
+        </p:sp>
+        <p:sp>
+          <p:nvSpPr>
+            <p:cNvPr id="9" name="椭圆 8"/>
+            <p:cNvSpPr/>
+            <p:nvPr/>
+          </p:nvSpPr>
+          <p:spPr>
+            <a:xfrm>
+              <a:off x="7037832" y="4543599"/>
+              <a:ext cx="246888" cy="246888"/>
+            </a:xfrm>
+            <a:prstGeom prst="ellipse">
+              <a:avLst/>
+            </a:prstGeom>
+          </p:spPr>
+          <p:style>
+            <a:lnRef idx="2">
+              <a:schemeClr val="accent2">
+                <a:shade val="50000"/>
+              </a:schemeClr>
+            </a:lnRef>
+            <a:fillRef idx="1">
+              <a:schemeClr val="accent2"/>
+            </a:fillRef>
+            <a:effectRef idx="0">
+              <a:schemeClr val="accent2"/>
+            </a:effectRef>
+            <a:fontRef idx="minor">
+              <a:schemeClr val="lt1"/>
+            </a:fontRef>
+          </p:style>
+          <p:txBody>
+            <a:bodyPr rtlCol="0" anchor="ctr"/>
+            <a:lstStyle/>
+            <a:p>
+              <a:pPr algn="ctr"/>
+              <a:endParaRPr lang="zh-CN" altLang="en-US"/>
+            </a:p>
+          </p:txBody>
+        </p:sp>
+        <p:sp>
+          <p:nvSpPr>
+            <p:cNvPr id="10" name="椭圆 9"/>
+            <p:cNvSpPr/>
+            <p:nvPr/>
+          </p:nvSpPr>
+          <p:spPr>
+            <a:xfrm>
+              <a:off x="7037832" y="4866020"/>
+              <a:ext cx="246888" cy="246888"/>
+            </a:xfrm>
+            <a:prstGeom prst="ellipse">
+              <a:avLst/>
+            </a:prstGeom>
+          </p:spPr>
+          <p:style>
+            <a:lnRef idx="2">
+              <a:schemeClr val="accent2">
+                <a:shade val="50000"/>
+              </a:schemeClr>
+            </a:lnRef>
+            <a:fillRef idx="1">
+              <a:schemeClr val="accent2"/>
+            </a:fillRef>
+            <a:effectRef idx="0">
+              <a:schemeClr val="accent2"/>
+            </a:effectRef>
+            <a:fontRef idx="minor">
+              <a:schemeClr val="lt1"/>
+            </a:fontRef>
+          </p:style>
+          <p:txBody>
+            <a:bodyPr rtlCol="0" anchor="ctr"/>
+            <a:lstStyle/>
+            <a:p>
+              <a:pPr algn="ctr"/>
+              <a:endParaRPr lang="zh-CN" altLang="en-US"/>
+            </a:p>
+          </p:txBody>
+        </p:sp>
+      </p:grpSp>
+      <p:sp>
+        <p:nvSpPr>
+          <p:cNvPr id="12" name="文本框 11"/>
+          <p:cNvSpPr txBox="1"/>
+          <p:nvPr/>
+        </p:nvSpPr>
+        <p:spPr>
+          <a:xfrm>
+            <a:off x="2962656" y="6360160"/>
+            <a:ext cx="953787" cy="369332"/>
+          </a:xfrm>
+          <a:prstGeom prst="rect">
+            <a:avLst/>
+          </a:prstGeom>
+        </p:spPr>
+        <p:style>
+          <a:lnRef idx="2">
+            <a:schemeClr val="dk1"/>
+          </a:lnRef>
+          <a:fillRef idx="1">
+            <a:schemeClr val="lt1"/>
+          </a:fillRef>
+          <a:effectRef idx="0">
+            <a:schemeClr val="dk1"/>
+          </a:effectRef>
+          <a:fontRef idx="minor">
+            <a:schemeClr val="dk1"/>
+          </a:fontRef>
+        </p:style>
+        <p:txBody>
+          <a:bodyPr wrap="none" rtlCol="0">
+            <a:spAutoFit/>
+          </a:bodyPr>
+          <a:lstStyle/>
+          <a:p>
+            <a:r>
+              <a:rPr lang="en-US" altLang="zh-CN" dirty="0" smtClean="0"/>
+              <a:t>Encoder</a:t>
+            </a:r>
+            <a:endParaRPr lang="zh-CN" altLang="en-US" dirty="0"/>
+          </a:p>
+        </p:txBody>
+      </p:sp>
+      <p:sp>
+        <p:nvSpPr>
+          <p:cNvPr id="13" name="文本框 12"/>
+          <p:cNvSpPr txBox="1"/>
+          <p:nvPr/>
+        </p:nvSpPr>
+        <p:spPr>
+          <a:xfrm>
+            <a:off x="6617088" y="6356731"/>
+            <a:ext cx="1088375" cy="369332"/>
+          </a:xfrm>
+          <a:prstGeom prst="rect">
+            <a:avLst/>
+          </a:prstGeom>
+        </p:spPr>
+        <p:style>
+          <a:lnRef idx="2">
+            <a:schemeClr val="dk1"/>
+          </a:lnRef>
+          <a:fillRef idx="1">
+            <a:schemeClr val="lt1"/>
+          </a:fillRef>
+          <a:effectRef idx="0">
+            <a:schemeClr val="dk1"/>
+          </a:effectRef>
+          <a:fontRef idx="minor">
+            <a:schemeClr val="dk1"/>
+          </a:fontRef>
+        </p:style>
+        <p:txBody>
+          <a:bodyPr wrap="none" rtlCol="0">
+            <a:spAutoFit/>
+          </a:bodyPr>
+          <a:lstStyle/>
+          <a:p>
+            <a:r>
+              <a:rPr lang="en-US" altLang="zh-CN" dirty="0" smtClean="0"/>
+              <a:t>Last State</a:t>
+            </a:r>
+            <a:endParaRPr lang="zh-CN" altLang="en-US" dirty="0"/>
+          </a:p>
+        </p:txBody>
+      </p:sp>
+      <p:sp>
+        <p:nvSpPr>
+          <p:cNvPr id="14" name="文本框 13"/>
+          <p:cNvSpPr txBox="1"/>
+          <p:nvPr/>
+        </p:nvSpPr>
+        <p:spPr>
+          <a:xfrm>
+            <a:off x="8884800" y="6364986"/>
+            <a:ext cx="977832" cy="369332"/>
+          </a:xfrm>
+          <a:prstGeom prst="rect">
+            <a:avLst/>
+          </a:prstGeom>
+        </p:spPr>
+        <p:style>
+          <a:lnRef idx="2">
+            <a:schemeClr val="dk1"/>
+          </a:lnRef>
+          <a:fillRef idx="1">
+            <a:schemeClr val="lt1"/>
+          </a:fillRef>
+          <a:effectRef idx="0">
+            <a:schemeClr val="dk1"/>
+          </a:effectRef>
+          <a:fontRef idx="minor">
+            <a:schemeClr val="dk1"/>
+          </a:fontRef>
+        </p:style>
+        <p:txBody>
+          <a:bodyPr wrap="none" rtlCol="0">
+            <a:spAutoFit/>
+          </a:bodyPr>
+          <a:lstStyle/>
+          <a:p>
+            <a:r>
+              <a:rPr lang="en-US" altLang="zh-CN" dirty="0" smtClean="0"/>
+              <a:t>Decoder</a:t>
+            </a:r>
+            <a:endParaRPr lang="zh-CN" altLang="en-US" dirty="0"/>
+          </a:p>
+        </p:txBody>
+      </p:sp>
+      <p:cxnSp>
+        <p:nvCxnSpPr>
+          <p:cNvPr id="16" name="直接箭头连接符 15"/>
+          <p:cNvCxnSpPr/>
+          <p:nvPr/>
+        </p:nvCxnSpPr>
+        <p:spPr>
+          <a:xfrm>
+            <a:off x="7705463" y="4543599"/>
+            <a:ext cx="533281" cy="0"/>
+          </a:xfrm>
+          <a:prstGeom prst="straightConnector1">
+            <a:avLst/>
+          </a:prstGeom>
+          <a:ln>
+            <a:tailEnd type="triangle"/>
+          </a:ln>
+        </p:spPr>
+        <p:style>
+          <a:lnRef idx="3">
+            <a:schemeClr val="dk1"/>
+          </a:lnRef>
+          <a:fillRef idx="0">
+            <a:schemeClr val="dk1"/>
+          </a:fillRef>
+          <a:effectRef idx="2">
+            <a:schemeClr val="dk1"/>
+          </a:effectRef>
+          <a:fontRef idx="minor">
+            <a:schemeClr val="tx1"/>
+          </a:fontRef>
+        </p:style>
+      </p:cxnSp>
+      <p:sp>
+        <p:nvSpPr>
+          <p:cNvPr id="17" name="文本框 16"/>
+          <p:cNvSpPr txBox="1"/>
+          <p:nvPr/>
+        </p:nvSpPr>
+        <p:spPr>
+          <a:xfrm>
+            <a:off x="9202034" y="4346186"/>
+            <a:ext cx="343364" cy="369332"/>
+          </a:xfrm>
+          <a:prstGeom prst="rect">
+            <a:avLst/>
+          </a:prstGeom>
+          <a:noFill/>
+        </p:spPr>
+        <p:txBody>
+          <a:bodyPr wrap="none" rtlCol="0">
+            <a:spAutoFit/>
+          </a:bodyPr>
+          <a:lstStyle/>
+          <a:p>
+            <a:r>
+              <a:rPr lang="en-US" altLang="zh-CN" dirty="0" smtClean="0"/>
+              <a:t>…</a:t>
+            </a:r>
+            <a:endParaRPr lang="zh-CN" altLang="en-US" dirty="0"/>
           </a:p>
         </p:txBody>
       </p:sp>
@@ -4474,7 +5790,7 @@
 </p:sld>
 </file>
 
-<file path=ppt/slides/slide15.xml><?xml version="1.0" encoding="utf-8"?>
+<file path=ppt/slides/slide18.xml><?xml version="1.0" encoding="utf-8"?>
 <p:sld xmlns:a="http://schemas.openxmlformats.org/drawingml/2006/main" xmlns:r="http://schemas.openxmlformats.org/officeDocument/2006/relationships" xmlns:p="http://schemas.openxmlformats.org/presentationml/2006/main">
   <p:cSld>
     <p:spTree>
@@ -6666,7 +7982,6 @@
               <a:rPr lang="en-US" altLang="zh-CN" dirty="0" smtClean="0"/>
               <a:t>Etc.</a:t>
             </a:r>
-            <a:endParaRPr lang="en-US" altLang="zh-CN" dirty="0" smtClean="0"/>
           </a:p>
         </p:txBody>
       </p:sp>
@@ -6724,11 +8039,7 @@
           <a:p>
             <a:r>
               <a:rPr lang="en-US" altLang="zh-CN" dirty="0" smtClean="0"/>
-              <a:t>Document </a:t>
-            </a:r>
-            <a:r>
-              <a:rPr lang="en-US" altLang="zh-CN" dirty="0" smtClean="0"/>
-              <a:t>Representation - Unsupervised</a:t>
+              <a:t>Document Representation - Unsupervised</a:t>
             </a:r>
             <a:endParaRPr lang="zh-CN" altLang="en-US" dirty="0"/>
           </a:p>
@@ -6765,11 +8076,7 @@
             <a:pPr lvl="1"/>
             <a:r>
               <a:rPr lang="en-US" altLang="zh-CN" dirty="0" smtClean="0"/>
-              <a:t>Importance </a:t>
-            </a:r>
-            <a:r>
-              <a:rPr lang="en-US" altLang="zh-CN" dirty="0" smtClean="0"/>
-              <a:t>modeling</a:t>
+              <a:t>Importance modeling</a:t>
             </a:r>
           </a:p>
           <a:p>
@@ -6777,7 +8084,6 @@
               <a:rPr lang="en-US" altLang="zh-CN" dirty="0" smtClean="0"/>
               <a:t>Random Project</a:t>
             </a:r>
-            <a:endParaRPr lang="en-US" altLang="zh-CN" dirty="0" smtClean="0"/>
           </a:p>
           <a:p>
             <a:r>

</xml_diff>